<commit_message>
Changed Title to Report and some changes in the PPT
</commit_message>
<xml_diff>
--- a/22_Shruti_Synthesizer/Documents/Shruti 22 Synthesiser.pptx
+++ b/22_Shruti_Synthesizer/Documents/Shruti 22 Synthesiser.pptx
@@ -12755,16 +12755,21 @@
             </a:r>
             <a:r>
               <a:rPr lang="en-US" sz="2400" dirty="0" smtClean="0"/>
-              <a:t> has been tested using </a:t>
-            </a:r>
-            <a:r>
-              <a:rPr lang="en-US" sz="2400" dirty="0" err="1" smtClean="0"/>
-              <a:t>Scilab</a:t>
-            </a:r>
-            <a:r>
-              <a:rPr lang="en-US" sz="2400" dirty="0" smtClean="0"/>
-              <a:t> interpreter.</a:t>
-            </a:r>
+              <a:t> has been tested </a:t>
+            </a:r>
+            <a:r>
+              <a:rPr lang="en-US" sz="2400" smtClean="0"/>
+              <a:t>using </a:t>
+            </a:r>
+            <a:r>
+              <a:rPr lang="en-US" sz="2400" smtClean="0"/>
+              <a:t>Python</a:t>
+            </a:r>
+            <a:r>
+              <a:rPr lang="en-US" sz="2400" smtClean="0"/>
+              <a:t>.</a:t>
+            </a:r>
+            <a:endParaRPr lang="en-US" sz="2400" dirty="0" smtClean="0"/>
           </a:p>
         </p:txBody>
       </p:sp>
@@ -12957,12 +12962,12 @@
               <a:t> with                                                                                                                             </a:t>
             </a:r>
             <a:r>
-              <a:rPr lang="en-US" sz="2600" dirty="0" err="1" smtClean="0"/>
-              <a:t>Scilab</a:t>
-            </a:r>
-            <a:r>
               <a:rPr lang="en-US" sz="2600" dirty="0" smtClean="0"/>
-              <a:t>  Interpreter.     </a:t>
+              <a:t>Python</a:t>
+            </a:r>
+            <a:r>
+              <a:rPr lang="en-US" sz="2600" dirty="0" smtClean="0"/>
+              <a:t>.     </a:t>
             </a:r>
             <a:endParaRPr lang="en-US" sz="2600" dirty="0"/>
           </a:p>
@@ -14893,13 +14898,8 @@
             </a:pPr>
             <a:r>
               <a:rPr lang="en-IN" dirty="0" smtClean="0"/>
-              <a:t>The Main Difference in Indian Classical music and Western music is the </a:t>
-            </a:r>
-            <a:r>
-              <a:rPr lang="en-IN" dirty="0" smtClean="0"/>
-              <a:t> number of notes they are using in their octaves  </a:t>
-            </a:r>
-            <a:endParaRPr lang="en-IN" dirty="0" smtClean="0"/>
+              <a:t>The Main Difference in Indian Classical music and Western music is the  number of notes they are using in their octaves  </a:t>
+            </a:r>
           </a:p>
         </p:txBody>
       </p:sp>
@@ -14927,25 +14927,13 @@
           <a:p>
             <a:r>
               <a:rPr lang="en-IN" b="1" dirty="0" smtClean="0"/>
-              <a:t>Western </a:t>
-            </a:r>
-            <a:r>
-              <a:rPr lang="en-IN" b="1" dirty="0" smtClean="0"/>
-              <a:t>Music</a:t>
+              <a:t>Western Music</a:t>
             </a:r>
           </a:p>
           <a:p>
             <a:r>
               <a:rPr lang="en-IN" dirty="0" smtClean="0"/>
-              <a:t>Has </a:t>
-            </a:r>
-            <a:r>
-              <a:rPr lang="en-IN" dirty="0" smtClean="0"/>
-              <a:t>12 Notes in </a:t>
-            </a:r>
-            <a:r>
-              <a:rPr lang="en-IN" dirty="0" smtClean="0"/>
-              <a:t>Octave</a:t>
+              <a:t>Has 12 Notes in Octave</a:t>
             </a:r>
           </a:p>
           <a:p>

</xml_diff>